<commit_message>
slide fixed / published.
</commit_message>
<xml_diff>
--- a/slides/spoana13.pptx
+++ b/slides/spoana13.pptx
@@ -209,7 +209,7 @@
           <a:p>
             <a:fld id="{DE37EDCA-4771-4610-925E-8EEDA908E30D}" type="datetimeFigureOut">
               <a:rPr kumimoji="1" lang="ja-JP" altLang="en-US" smtClean="0"/>
-              <a:t>2022/11/23</a:t>
+              <a:t>2022/11/26</a:t>
             </a:fld>
             <a:endParaRPr kumimoji="1" lang="ja-JP" altLang="en-US"/>
           </a:p>
@@ -3249,7 +3249,7 @@
           <a:p>
             <a:fld id="{3D56D7E1-3519-40E1-A263-6500AF722914}" type="datetimeFigureOut">
               <a:rPr kumimoji="1" lang="ja-JP" altLang="en-US" smtClean="0"/>
-              <a:t>2022/11/23</a:t>
+              <a:t>2022/11/26</a:t>
             </a:fld>
             <a:endParaRPr kumimoji="1" lang="ja-JP" altLang="en-US"/>
           </a:p>
@@ -3479,7 +3479,7 @@
           <a:p>
             <a:fld id="{3D56D7E1-3519-40E1-A263-6500AF722914}" type="datetimeFigureOut">
               <a:rPr kumimoji="1" lang="ja-JP" altLang="en-US" smtClean="0"/>
-              <a:t>2022/11/23</a:t>
+              <a:t>2022/11/26</a:t>
             </a:fld>
             <a:endParaRPr kumimoji="1" lang="ja-JP" altLang="en-US"/>
           </a:p>
@@ -3719,7 +3719,7 @@
           <a:p>
             <a:fld id="{3D56D7E1-3519-40E1-A263-6500AF722914}" type="datetimeFigureOut">
               <a:rPr kumimoji="1" lang="ja-JP" altLang="en-US" smtClean="0"/>
-              <a:t>2022/11/23</a:t>
+              <a:t>2022/11/26</a:t>
             </a:fld>
             <a:endParaRPr kumimoji="1" lang="ja-JP" altLang="en-US"/>
           </a:p>
@@ -3961,7 +3961,7 @@
               <a:pPr>
                 <a:defRPr/>
               </a:pPr>
-              <a:t>2022/11/23</a:t>
+              <a:t>2022/11/26</a:t>
             </a:fld>
             <a:endParaRPr lang="ja-JP" altLang="en-US"/>
           </a:p>
@@ -4265,7 +4265,7 @@
               <a:pPr>
                 <a:defRPr/>
               </a:pPr>
-              <a:t>2022/11/23</a:t>
+              <a:t>2022/11/26</a:t>
             </a:fld>
             <a:endParaRPr lang="ja-JP" altLang="en-US"/>
           </a:p>
@@ -4537,7 +4537,7 @@
           <a:p>
             <a:fld id="{3D56D7E1-3519-40E1-A263-6500AF722914}" type="datetimeFigureOut">
               <a:rPr kumimoji="1" lang="ja-JP" altLang="en-US" smtClean="0"/>
-              <a:t>2022/11/23</a:t>
+              <a:t>2022/11/26</a:t>
             </a:fld>
             <a:endParaRPr kumimoji="1" lang="ja-JP" altLang="en-US"/>
           </a:p>
@@ -4812,7 +4812,7 @@
           <a:p>
             <a:fld id="{3D56D7E1-3519-40E1-A263-6500AF722914}" type="datetimeFigureOut">
               <a:rPr kumimoji="1" lang="ja-JP" altLang="en-US" smtClean="0"/>
-              <a:t>2022/11/23</a:t>
+              <a:t>2022/11/26</a:t>
             </a:fld>
             <a:endParaRPr kumimoji="1" lang="ja-JP" altLang="en-US"/>
           </a:p>
@@ -5141,7 +5141,7 @@
           <a:p>
             <a:fld id="{3D56D7E1-3519-40E1-A263-6500AF722914}" type="datetimeFigureOut">
               <a:rPr kumimoji="1" lang="ja-JP" altLang="en-US" smtClean="0"/>
-              <a:t>2022/11/23</a:t>
+              <a:t>2022/11/26</a:t>
             </a:fld>
             <a:endParaRPr kumimoji="1" lang="ja-JP" altLang="en-US"/>
           </a:p>
@@ -5617,7 +5617,7 @@
           <a:p>
             <a:fld id="{3D56D7E1-3519-40E1-A263-6500AF722914}" type="datetimeFigureOut">
               <a:rPr kumimoji="1" lang="ja-JP" altLang="en-US" smtClean="0"/>
-              <a:t>2022/11/23</a:t>
+              <a:t>2022/11/26</a:t>
             </a:fld>
             <a:endParaRPr kumimoji="1" lang="ja-JP" altLang="en-US"/>
           </a:p>
@@ -5758,7 +5758,7 @@
           <a:p>
             <a:fld id="{3D56D7E1-3519-40E1-A263-6500AF722914}" type="datetimeFigureOut">
               <a:rPr kumimoji="1" lang="ja-JP" altLang="en-US" smtClean="0"/>
-              <a:t>2022/11/23</a:t>
+              <a:t>2022/11/26</a:t>
             </a:fld>
             <a:endParaRPr kumimoji="1" lang="ja-JP" altLang="en-US"/>
           </a:p>
@@ -5871,7 +5871,7 @@
           <a:p>
             <a:fld id="{3D56D7E1-3519-40E1-A263-6500AF722914}" type="datetimeFigureOut">
               <a:rPr kumimoji="1" lang="ja-JP" altLang="en-US" smtClean="0"/>
-              <a:t>2022/11/23</a:t>
+              <a:t>2022/11/26</a:t>
             </a:fld>
             <a:endParaRPr kumimoji="1" lang="ja-JP" altLang="en-US"/>
           </a:p>
@@ -6214,7 +6214,7 @@
           <a:p>
             <a:fld id="{3D56D7E1-3519-40E1-A263-6500AF722914}" type="datetimeFigureOut">
               <a:rPr kumimoji="1" lang="ja-JP" altLang="en-US" smtClean="0"/>
-              <a:t>2022/11/23</a:t>
+              <a:t>2022/11/26</a:t>
             </a:fld>
             <a:endParaRPr kumimoji="1" lang="ja-JP" altLang="en-US"/>
           </a:p>
@@ -6502,7 +6502,7 @@
           <a:p>
             <a:fld id="{3D56D7E1-3519-40E1-A263-6500AF722914}" type="datetimeFigureOut">
               <a:rPr kumimoji="1" lang="ja-JP" altLang="en-US" smtClean="0"/>
-              <a:t>2022/11/23</a:t>
+              <a:t>2022/11/26</a:t>
             </a:fld>
             <a:endParaRPr kumimoji="1" lang="ja-JP" altLang="en-US"/>
           </a:p>
@@ -6775,7 +6775,7 @@
           <a:p>
             <a:fld id="{3D56D7E1-3519-40E1-A263-6500AF722914}" type="datetimeFigureOut">
               <a:rPr kumimoji="1" lang="ja-JP" altLang="en-US" smtClean="0"/>
-              <a:t>2022/11/23</a:t>
+              <a:t>2022/11/26</a:t>
             </a:fld>
             <a:endParaRPr kumimoji="1" lang="ja-JP" altLang="en-US"/>
           </a:p>
@@ -8308,7 +8308,7 @@
         <p:spPr>
           <a:xfrm>
             <a:off x="541338" y="1376363"/>
-            <a:ext cx="11109325" cy="4800600"/>
+            <a:ext cx="11109325" cy="4256341"/>
           </a:xfrm>
         </p:spPr>
         <p:txBody>
@@ -8462,23 +8462,19 @@
                 <a:latin typeface="Cambria" panose="02040503050406030204" pitchFamily="18" charset="0"/>
                 <a:ea typeface="MS UI Gothic" panose="020B0600070205080204" pitchFamily="50" charset="-128"/>
               </a:rPr>
-              <a:t>無観客で声が通りやすい？：その効果がホーム・ビジターで異なるのか？</a:t>
+              <a:t>無観客で声が通りやすい？：その効果がホーム・ビジターで異なるのか</a:t>
+            </a:r>
+            <a:r>
+              <a:rPr lang="ja-JP" altLang="en-US" dirty="0" smtClean="0">
+                <a:latin typeface="Cambria" panose="02040503050406030204" pitchFamily="18" charset="0"/>
+                <a:ea typeface="MS UI Gothic" panose="020B0600070205080204" pitchFamily="50" charset="-128"/>
+              </a:rPr>
+              <a:t>？</a:t>
             </a:r>
             <a:endParaRPr lang="en-US" altLang="ja-JP" dirty="0">
               <a:latin typeface="Cambria" panose="02040503050406030204" pitchFamily="18" charset="0"/>
               <a:ea typeface="MS UI Gothic" panose="020B0600070205080204" pitchFamily="50" charset="-128"/>
             </a:endParaRPr>
-          </a:p>
-          <a:p>
-            <a:pPr marL="1028700" lvl="1" indent="-342900" eaLnBrk="1" hangingPunct="1"/>
-            <a:r>
-              <a:rPr lang="ja-JP" altLang="en-US" dirty="0">
-                <a:latin typeface="Cambria" panose="02040503050406030204" pitchFamily="18" charset="0"/>
-                <a:ea typeface="MS UI Gothic" panose="020B0600070205080204" pitchFamily="50" charset="-128"/>
-                <a:cs typeface="Source Han Sans JP Normal"/>
-              </a:rPr>
-              <a:t>ホームアドバンテージの「正しさ」→次スライドへ</a:t>
-            </a:r>
           </a:p>
         </p:txBody>
       </p:sp>
@@ -8738,39 +8734,7 @@
                 <a:ea typeface="MS UI Gothic" panose="020B0600070205080204" pitchFamily="50" charset="-128"/>
                 <a:cs typeface="Source Han Sans JP Normal"/>
               </a:rPr>
-              <a:t>では、判定の自動化に</a:t>
-            </a:r>
-            <a:r>
-              <a:rPr lang="ja-JP" altLang="en-US" dirty="0" smtClean="0">
-                <a:latin typeface="Cambria" panose="02040503050406030204" pitchFamily="18" charset="0"/>
-                <a:ea typeface="MS UI Gothic" panose="020B0600070205080204" pitchFamily="50" charset="-128"/>
-                <a:cs typeface="Source Han Sans JP Normal"/>
-              </a:rPr>
-              <a:t>関する</a:t>
-            </a:r>
-            <a:r>
-              <a:rPr lang="ja-JP" altLang="en-US" dirty="0" smtClean="0">
-                <a:latin typeface="Cambria" panose="02040503050406030204" pitchFamily="18" charset="0"/>
-                <a:ea typeface="MS UI Gothic" panose="020B0600070205080204" pitchFamily="50" charset="-128"/>
-                <a:cs typeface="Source Han Sans JP Normal"/>
-              </a:rPr>
-              <a:t>制度変更・議論</a:t>
-            </a:r>
-            <a:r>
-              <a:rPr lang="ja-JP" altLang="en-US" dirty="0" smtClean="0">
-                <a:latin typeface="Cambria" panose="02040503050406030204" pitchFamily="18" charset="0"/>
-                <a:ea typeface="MS UI Gothic" panose="020B0600070205080204" pitchFamily="50" charset="-128"/>
-                <a:cs typeface="Source Han Sans JP Normal"/>
-              </a:rPr>
-              <a:t>が</a:t>
-            </a:r>
-            <a:r>
-              <a:rPr lang="ja-JP" altLang="en-US" dirty="0" smtClean="0">
-                <a:latin typeface="Cambria" panose="02040503050406030204" pitchFamily="18" charset="0"/>
-                <a:ea typeface="MS UI Gothic" panose="020B0600070205080204" pitchFamily="50" charset="-128"/>
-                <a:cs typeface="Source Han Sans JP Normal"/>
-              </a:rPr>
-              <a:t>進む</a:t>
+              <a:t>では、判定の自動化に関する制度変更・議論が進む</a:t>
             </a:r>
             <a:endParaRPr lang="en-US" altLang="ja-JP" dirty="0" smtClean="0">
               <a:latin typeface="Cambria" panose="02040503050406030204" pitchFamily="18" charset="0"/>
@@ -8792,14 +8756,7 @@
                 <a:latin typeface="Cambria" panose="02040503050406030204" pitchFamily="18" charset="0"/>
                 <a:ea typeface="MS UI Gothic" panose="020B0600070205080204" pitchFamily="50" charset="-128"/>
               </a:rPr>
-              <a:t>で議論したような</a:t>
-            </a:r>
-            <a:r>
-              <a:rPr lang="ja-JP" altLang="en-US" dirty="0" smtClean="0">
-                <a:latin typeface="Cambria" panose="02040503050406030204" pitchFamily="18" charset="0"/>
-                <a:ea typeface="MS UI Gothic" panose="020B0600070205080204" pitchFamily="50" charset="-128"/>
-              </a:rPr>
-              <a:t>バイアスは</a:t>
+              <a:t>で議論したようなバイアスは</a:t>
             </a:r>
             <a:r>
               <a:rPr lang="en-US" altLang="ja-JP" dirty="0" smtClean="0">
@@ -8871,6 +8828,13 @@
           </a:p>
           <a:p>
             <a:pPr marL="1028700" lvl="1" indent="-342900" eaLnBrk="1" hangingPunct="1"/>
+            <a:r>
+              <a:rPr lang="ja-JP" altLang="en-US" dirty="0" smtClean="0">
+                <a:latin typeface="Cambria" panose="02040503050406030204" pitchFamily="18" charset="0"/>
+                <a:ea typeface="MS UI Gothic" panose="020B0600070205080204" pitchFamily="50" charset="-128"/>
+              </a:rPr>
+              <a:t>ピッチコールに対するジャッジレビュー制度</a:t>
+            </a:r>
             <a:endParaRPr lang="en-US" altLang="ja-JP" dirty="0" smtClean="0">
               <a:latin typeface="Cambria" panose="02040503050406030204" pitchFamily="18" charset="0"/>
               <a:ea typeface="MS UI Gothic" panose="020B0600070205080204" pitchFamily="50" charset="-128"/>
@@ -8893,7 +8857,7 @@
                 <a:latin typeface="Cambria" panose="02040503050406030204" pitchFamily="18" charset="0"/>
                 <a:ea typeface="MS UI Gothic" panose="020B0600070205080204" pitchFamily="50" charset="-128"/>
               </a:rPr>
-              <a:t>で、こうした傾向は競技の歴史が作り上げた</a:t>
+              <a:t>で、こうした傾向は競技の歴史が作り上げた「知恵」でもある</a:t>
             </a:r>
             <a:endParaRPr lang="en-US" altLang="ja-JP" dirty="0" smtClean="0">
               <a:latin typeface="Cambria" panose="02040503050406030204" pitchFamily="18" charset="0"/>
@@ -8917,18 +8881,25 @@
           <a:p>
             <a:pPr marL="1028700" lvl="1" indent="-342900" eaLnBrk="1" hangingPunct="1"/>
             <a:r>
+              <a:rPr lang="ja-JP" altLang="en-US" dirty="0" smtClean="0">
+                <a:latin typeface="Cambria" panose="02040503050406030204" pitchFamily="18" charset="0"/>
+                <a:ea typeface="MS UI Gothic" panose="020B0600070205080204" pitchFamily="50" charset="-128"/>
+              </a:rPr>
+              <a:t>属人的</a:t>
+            </a:r>
+            <a:r>
               <a:rPr lang="ja-JP" altLang="en-US" dirty="0">
                 <a:latin typeface="Cambria" panose="02040503050406030204" pitchFamily="18" charset="0"/>
                 <a:ea typeface="MS UI Gothic" panose="020B0600070205080204" pitchFamily="50" charset="-128"/>
               </a:rPr>
-              <a:t>ピッチャー</a:t>
+              <a:t>特性</a:t>
             </a:r>
             <a:r>
               <a:rPr lang="ja-JP" altLang="en-US" dirty="0" smtClean="0">
                 <a:latin typeface="Cambria" panose="02040503050406030204" pitchFamily="18" charset="0"/>
                 <a:ea typeface="MS UI Gothic" panose="020B0600070205080204" pitchFamily="50" charset="-128"/>
               </a:rPr>
-              <a:t>の打席：ストライクゾーンが広がる</a:t>
+              <a:t>に基づく差別は問題だが、ホームアドバンテージはどうか？</a:t>
             </a:r>
             <a:endParaRPr lang="en-US" altLang="ja-JP" dirty="0" smtClean="0">
               <a:latin typeface="Cambria" panose="02040503050406030204" pitchFamily="18" charset="0"/>
@@ -8938,27 +8909,20 @@
           <a:p>
             <a:pPr marL="1028700" lvl="1" indent="-342900" eaLnBrk="1" hangingPunct="1"/>
             <a:r>
+              <a:rPr lang="ja-JP" altLang="en-US" dirty="0">
+                <a:latin typeface="Cambria" panose="02040503050406030204" pitchFamily="18" charset="0"/>
+                <a:ea typeface="MS UI Gothic" panose="020B0600070205080204" pitchFamily="50" charset="-128"/>
+              </a:rPr>
+              <a:t>ピッチャーの打席：ストライクゾーンが広がる→二刀流選手の</a:t>
+            </a:r>
+            <a:r>
               <a:rPr lang="ja-JP" altLang="en-US" dirty="0" smtClean="0">
                 <a:latin typeface="Cambria" panose="02040503050406030204" pitchFamily="18" charset="0"/>
                 <a:ea typeface="MS UI Gothic" panose="020B0600070205080204" pitchFamily="50" charset="-128"/>
               </a:rPr>
-              <a:t>属人的</a:t>
-            </a:r>
-            <a:r>
-              <a:rPr lang="ja-JP" altLang="en-US" dirty="0">
-                <a:latin typeface="Cambria" panose="02040503050406030204" pitchFamily="18" charset="0"/>
-                <a:ea typeface="MS UI Gothic" panose="020B0600070205080204" pitchFamily="50" charset="-128"/>
-              </a:rPr>
-              <a:t>特性</a:t>
-            </a:r>
-            <a:r>
-              <a:rPr lang="ja-JP" altLang="en-US" dirty="0" smtClean="0">
-                <a:latin typeface="Cambria" panose="02040503050406030204" pitchFamily="18" charset="0"/>
-                <a:ea typeface="MS UI Gothic" panose="020B0600070205080204" pitchFamily="50" charset="-128"/>
-              </a:rPr>
-              <a:t>に基づく差別は問題だが、ホームアドバンテージはどうか？</a:t>
-            </a:r>
-            <a:endParaRPr lang="en-US" altLang="ja-JP" dirty="0" smtClean="0">
+              <a:t>登場</a:t>
+            </a:r>
+            <a:endParaRPr lang="en-US" altLang="ja-JP" dirty="0">
               <a:latin typeface="Cambria" panose="02040503050406030204" pitchFamily="18" charset="0"/>
               <a:ea typeface="MS UI Gothic" panose="020B0600070205080204" pitchFamily="50" charset="-128"/>
             </a:endParaRPr>
@@ -9043,6 +9007,36 @@
           </a:p>
         </p:txBody>
       </p:sp>
+      <p:pic>
+        <p:nvPicPr>
+          <p:cNvPr id="8" name="図 7"/>
+          <p:cNvPicPr>
+            <a:picLocks noChangeAspect="1"/>
+          </p:cNvPicPr>
+          <p:nvPr/>
+        </p:nvPicPr>
+        <p:blipFill>
+          <a:blip r:embed="rId4" cstate="hqprint">
+            <a:extLst>
+              <a:ext uri="{28A0092B-C50C-407E-A947-70E740481C1C}">
+                <a14:useLocalDpi xmlns:a14="http://schemas.microsoft.com/office/drawing/2010/main" val="0"/>
+              </a:ext>
+            </a:extLst>
+          </a:blip>
+          <a:stretch>
+            <a:fillRect/>
+          </a:stretch>
+        </p:blipFill>
+        <p:spPr>
+          <a:xfrm>
+            <a:off x="10378111" y="3154680"/>
+            <a:ext cx="1595463" cy="1591056"/>
+          </a:xfrm>
+          <a:prstGeom prst="rect">
+            <a:avLst/>
+          </a:prstGeom>
+        </p:spPr>
+      </p:pic>
     </p:spTree>
     <p:extLst>
       <p:ext uri="{BB962C8B-B14F-4D97-AF65-F5344CB8AC3E}">
@@ -9092,12 +9086,12 @@
         <p:spPr>
           <a:xfrm>
             <a:off x="541338" y="415925"/>
-            <a:ext cx="5129212" cy="644525"/>
+            <a:ext cx="5923470" cy="644525"/>
           </a:xfrm>
         </p:spPr>
         <p:txBody>
           <a:bodyPr rtlCol="0">
-            <a:normAutofit/>
+            <a:normAutofit fontScale="90000"/>
           </a:bodyPr>
           <a:lstStyle/>
           <a:p>
@@ -9108,12 +9102,20 @@
               <a:defRPr/>
             </a:pPr>
             <a:r>
-              <a:rPr lang="en-US" altLang="ja-JP" dirty="0">
+              <a:rPr lang="en-US" altLang="ja-JP" dirty="0" smtClean="0">
                 <a:latin typeface="Cambria" panose="02040503050406030204" pitchFamily="18" charset="0"/>
                 <a:ea typeface="MS UI Gothic" panose="020B0600070205080204" pitchFamily="50" charset="-128"/>
                 <a:cs typeface="+mj-cs"/>
               </a:rPr>
-              <a:t>Appendix</a:t>
+              <a:t>Appendix: </a:t>
+            </a:r>
+            <a:r>
+              <a:rPr lang="ja-JP" altLang="en-US" dirty="0" smtClean="0">
+                <a:latin typeface="Cambria" panose="02040503050406030204" pitchFamily="18" charset="0"/>
+                <a:ea typeface="MS UI Gothic" panose="020B0600070205080204" pitchFamily="50" charset="-128"/>
+                <a:cs typeface="+mj-cs"/>
+              </a:rPr>
+              <a:t>平均的なストライクコール確率</a:t>
             </a:r>
             <a:endParaRPr lang="ja-JP" altLang="en-US" dirty="0">
               <a:latin typeface="Cambria" panose="02040503050406030204" pitchFamily="18" charset="0"/>
@@ -9260,6 +9262,94 @@
           </a:prstGeom>
         </p:spPr>
       </p:pic>
+      <p:sp>
+        <p:nvSpPr>
+          <p:cNvPr id="3" name="テキスト ボックス 2"/>
+          <p:cNvSpPr txBox="1"/>
+          <p:nvPr/>
+        </p:nvSpPr>
+        <p:spPr>
+          <a:xfrm>
+            <a:off x="1655064" y="4946904"/>
+            <a:ext cx="2990088" cy="369332"/>
+          </a:xfrm>
+          <a:prstGeom prst="rect">
+            <a:avLst/>
+          </a:prstGeom>
+          <a:solidFill>
+            <a:srgbClr val="FFFF00"/>
+          </a:solidFill>
+          <a:ln>
+            <a:solidFill>
+              <a:schemeClr val="tx1"/>
+            </a:solidFill>
+          </a:ln>
+        </p:spPr>
+        <p:txBody>
+          <a:bodyPr wrap="square" rtlCol="0">
+            <a:spAutoFit/>
+          </a:bodyPr>
+          <a:lstStyle/>
+          <a:p>
+            <a:pPr algn="ctr"/>
+            <a:r>
+              <a:rPr kumimoji="1" lang="ja-JP" altLang="en-US" b="1" dirty="0" smtClean="0"/>
+              <a:t>カウント</a:t>
+            </a:r>
+            <a:r>
+              <a:rPr kumimoji="1" lang="en-US" altLang="ja-JP" b="1" dirty="0" smtClean="0"/>
+              <a:t>0-2</a:t>
+            </a:r>
+            <a:endParaRPr kumimoji="1" lang="ja-JP" altLang="en-US" b="1" dirty="0"/>
+          </a:p>
+        </p:txBody>
+      </p:sp>
+      <p:sp>
+        <p:nvSpPr>
+          <p:cNvPr id="9" name="テキスト ボックス 8"/>
+          <p:cNvSpPr txBox="1"/>
+          <p:nvPr/>
+        </p:nvSpPr>
+        <p:spPr>
+          <a:xfrm>
+            <a:off x="6662928" y="4946904"/>
+            <a:ext cx="2990088" cy="369332"/>
+          </a:xfrm>
+          <a:prstGeom prst="rect">
+            <a:avLst/>
+          </a:prstGeom>
+          <a:solidFill>
+            <a:srgbClr val="92D050"/>
+          </a:solidFill>
+          <a:ln>
+            <a:solidFill>
+              <a:schemeClr val="tx1"/>
+            </a:solidFill>
+          </a:ln>
+        </p:spPr>
+        <p:txBody>
+          <a:bodyPr wrap="square" rtlCol="0">
+            <a:spAutoFit/>
+          </a:bodyPr>
+          <a:lstStyle/>
+          <a:p>
+            <a:pPr algn="ctr"/>
+            <a:r>
+              <a:rPr kumimoji="1" lang="ja-JP" altLang="en-US" b="1" dirty="0" smtClean="0"/>
+              <a:t>カウント</a:t>
+            </a:r>
+            <a:r>
+              <a:rPr lang="en-US" altLang="ja-JP" b="1" dirty="0" smtClean="0"/>
+              <a:t>3</a:t>
+            </a:r>
+            <a:r>
+              <a:rPr kumimoji="1" lang="en-US" altLang="ja-JP" b="1" dirty="0" smtClean="0"/>
+              <a:t>-0</a:t>
+            </a:r>
+            <a:endParaRPr kumimoji="1" lang="ja-JP" altLang="en-US" b="1" dirty="0"/>
+          </a:p>
+        </p:txBody>
+      </p:sp>
     </p:spTree>
     <p:extLst>
       <p:ext uri="{BB962C8B-B14F-4D97-AF65-F5344CB8AC3E}">
@@ -9451,11 +9541,32 @@
           <a:p>
             <a:pPr marL="1600200" lvl="2" indent="-457200" eaLnBrk="1" hangingPunct="1"/>
             <a:r>
+              <a:rPr lang="ja-JP" altLang="en-US" dirty="0" smtClean="0">
+                <a:latin typeface="Cambria" panose="02040503050406030204" pitchFamily="18" charset="0"/>
+                <a:ea typeface="MS UI Gothic" panose="020B0600070205080204" pitchFamily="50" charset="-128"/>
+              </a:rPr>
+              <a:t>博士後期課程学生</a:t>
+            </a:r>
+            <a:endParaRPr lang="en-US" altLang="ja-JP" dirty="0" smtClean="0">
+              <a:latin typeface="Cambria" panose="02040503050406030204" pitchFamily="18" charset="0"/>
+              <a:ea typeface="MS UI Gothic" panose="020B0600070205080204" pitchFamily="50" charset="-128"/>
+            </a:endParaRPr>
+          </a:p>
+          <a:p>
+            <a:pPr marL="1600200" lvl="2" indent="-457200" eaLnBrk="1" hangingPunct="1"/>
+            <a:r>
+              <a:rPr lang="ja-JP" altLang="en-US" dirty="0" smtClean="0">
+                <a:latin typeface="Cambria" panose="02040503050406030204" pitchFamily="18" charset="0"/>
+                <a:ea typeface="MS UI Gothic" panose="020B0600070205080204" pitchFamily="50" charset="-128"/>
+              </a:rPr>
+              <a:t>労働</a:t>
+            </a:r>
+            <a:r>
               <a:rPr lang="ja-JP" altLang="en-US" dirty="0">
                 <a:latin typeface="Cambria" panose="02040503050406030204" pitchFamily="18" charset="0"/>
                 <a:ea typeface="MS UI Gothic" panose="020B0600070205080204" pitchFamily="50" charset="-128"/>
               </a:rPr>
-              <a:t>労働経済学・行動経済学分野の実証研究が専門、スポーツのデータも頻繁に利用</a:t>
+              <a:t>経済学・行動経済学分野の実証研究が専門、スポーツのデータも頻繁に利用</a:t>
             </a:r>
             <a:endParaRPr lang="en-US" altLang="ja-JP" dirty="0">
               <a:latin typeface="Cambria" panose="02040503050406030204" pitchFamily="18" charset="0"/>
@@ -9573,7 +9684,15 @@
                 <a:ea typeface="MS UI Gothic" panose="020B0600070205080204" pitchFamily="50" charset="-128"/>
                 <a:cs typeface="Source Han Sans JP Normal"/>
               </a:rPr>
-              <a:t>公開してます</a:t>
+              <a:t>公開</a:t>
+            </a:r>
+            <a:r>
+              <a:rPr lang="ja-JP" altLang="en-US" dirty="0" smtClean="0">
+                <a:latin typeface="Cambria" panose="02040503050406030204" pitchFamily="18" charset="0"/>
+                <a:ea typeface="MS UI Gothic" panose="020B0600070205080204" pitchFamily="50" charset="-128"/>
+                <a:cs typeface="Source Han Sans JP Normal"/>
+              </a:rPr>
+              <a:t>しています</a:t>
             </a:r>
             <a:endParaRPr lang="en-US" altLang="ja-JP" dirty="0">
               <a:latin typeface="Cambria" panose="02040503050406030204" pitchFamily="18" charset="0"/>
@@ -9790,7 +9909,7 @@
         </p:blipFill>
         <p:spPr>
           <a:xfrm>
-            <a:off x="8281851" y="4120516"/>
+            <a:off x="8369749" y="4312540"/>
             <a:ext cx="3558540" cy="2372360"/>
           </a:xfrm>
           <a:prstGeom prst="rect">
@@ -9967,7 +10086,7 @@
           <a:p>
             <a:pPr marL="1143000" lvl="1" indent="-457200" eaLnBrk="1" hangingPunct="1"/>
             <a:r>
-              <a:rPr lang="en-US" altLang="ja-JP" dirty="0">
+              <a:rPr lang="en-US" altLang="ja-JP" b="1" dirty="0">
                 <a:latin typeface="Cambria" panose="02040503050406030204" pitchFamily="18" charset="0"/>
                 <a:ea typeface="MS UI Gothic" panose="020B0600070205080204" pitchFamily="50" charset="-128"/>
                 <a:cs typeface="Source Han Sans JP Normal"/>
@@ -9975,7 +10094,7 @@
               <a:t>Home Advantage (</a:t>
             </a:r>
             <a:r>
-              <a:rPr lang="ja-JP" altLang="en-US" dirty="0">
+              <a:rPr lang="ja-JP" altLang="en-US" b="1" dirty="0">
                 <a:latin typeface="Cambria" panose="02040503050406030204" pitchFamily="18" charset="0"/>
                 <a:ea typeface="MS UI Gothic" panose="020B0600070205080204" pitchFamily="50" charset="-128"/>
                 <a:cs typeface="Source Han Sans JP Normal"/>
@@ -9983,7 +10102,7 @@
               <a:t>ホームアドバンテージ</a:t>
             </a:r>
             <a:r>
-              <a:rPr lang="en-US" altLang="ja-JP" dirty="0">
+              <a:rPr lang="en-US" altLang="ja-JP" b="1" dirty="0">
                 <a:latin typeface="Cambria" panose="02040503050406030204" pitchFamily="18" charset="0"/>
                 <a:ea typeface="MS UI Gothic" panose="020B0600070205080204" pitchFamily="50" charset="-128"/>
                 <a:cs typeface="Source Han Sans JP Normal"/>
@@ -10026,10 +10145,18 @@
                 <a:ea typeface="MS UI Gothic" panose="020B0600070205080204" pitchFamily="50" charset="-128"/>
                 <a:cs typeface="Source Han Sans JP Normal"/>
               </a:rPr>
-              <a:t>球審自身が自らの意思でそうしているわけではなく、スタジアムに詰めかけた観客の存在</a:t>
-            </a:r>
-            <a:r>
-              <a:rPr lang="en-US" altLang="ja-JP" dirty="0">
+              <a:t>球審自身が自らの意思でそうしているわけではなく、スタジアムに詰めかけた</a:t>
+            </a:r>
+            <a:r>
+              <a:rPr lang="ja-JP" altLang="en-US" b="1" dirty="0">
+                <a:latin typeface="Cambria" panose="02040503050406030204" pitchFamily="18" charset="0"/>
+                <a:ea typeface="MS UI Gothic" panose="020B0600070205080204" pitchFamily="50" charset="-128"/>
+                <a:cs typeface="Source Han Sans JP Normal"/>
+              </a:rPr>
+              <a:t>観客の存在</a:t>
+            </a:r>
+            <a:r>
+              <a:rPr lang="en-US" altLang="ja-JP" b="1" dirty="0">
                 <a:latin typeface="Cambria" panose="02040503050406030204" pitchFamily="18" charset="0"/>
                 <a:ea typeface="MS UI Gothic" panose="020B0600070205080204" pitchFamily="50" charset="-128"/>
                 <a:cs typeface="Source Han Sans JP Normal"/>
@@ -10821,7 +10948,59 @@
                 <a:latin typeface="Cambria" panose="02040503050406030204" pitchFamily="18" charset="0"/>
                 <a:ea typeface="MS UI Gothic" panose="020B0600070205080204" pitchFamily="50" charset="-128"/>
               </a:rPr>
-              <a:t>(Moskowitz, Wertheim, 2011)</a:t>
+              <a:t>(Moskowitz, Wertheim, 2011</a:t>
+            </a:r>
+            <a:r>
+              <a:rPr lang="en-US" altLang="ja-JP" dirty="0" smtClean="0">
+                <a:latin typeface="Cambria" panose="02040503050406030204" pitchFamily="18" charset="0"/>
+                <a:ea typeface="MS UI Gothic" panose="020B0600070205080204" pitchFamily="50" charset="-128"/>
+              </a:rPr>
+              <a:t>)</a:t>
+            </a:r>
+          </a:p>
+          <a:p>
+            <a:pPr marL="1028700" lvl="1" indent="-342900" eaLnBrk="1" hangingPunct="1"/>
+            <a:r>
+              <a:rPr lang="ja-JP" altLang="en-US" dirty="0">
+                <a:latin typeface="Cambria" panose="02040503050406030204" pitchFamily="18" charset="0"/>
+                <a:ea typeface="MS UI Gothic" panose="020B0600070205080204" pitchFamily="50" charset="-128"/>
+              </a:rPr>
+              <a:t>国籍バイアス</a:t>
+            </a:r>
+            <a:r>
+              <a:rPr lang="ja-JP" altLang="en-US" dirty="0" smtClean="0">
+                <a:latin typeface="Cambria" panose="02040503050406030204" pitchFamily="18" charset="0"/>
+                <a:ea typeface="MS UI Gothic" panose="020B0600070205080204" pitchFamily="50" charset="-128"/>
+              </a:rPr>
+              <a:t>の影響は、動員数の少ない試合の方が大きい</a:t>
+            </a:r>
+            <a:r>
+              <a:rPr lang="en-US" altLang="ja-JP" dirty="0" smtClean="0">
+                <a:latin typeface="Cambria" panose="02040503050406030204" pitchFamily="18" charset="0"/>
+                <a:ea typeface="MS UI Gothic" panose="020B0600070205080204" pitchFamily="50" charset="-128"/>
+              </a:rPr>
+              <a:t>(Parsons </a:t>
+            </a:r>
+            <a:r>
+              <a:rPr lang="en-US" altLang="ja-JP" dirty="0">
+                <a:latin typeface="Cambria" panose="02040503050406030204" pitchFamily="18" charset="0"/>
+                <a:ea typeface="MS UI Gothic" panose="020B0600070205080204" pitchFamily="50" charset="-128"/>
+              </a:rPr>
+              <a:t>et al</a:t>
+            </a:r>
+            <a:r>
+              <a:rPr lang="en-US" altLang="ja-JP" dirty="0" smtClean="0">
+                <a:latin typeface="Cambria" panose="02040503050406030204" pitchFamily="18" charset="0"/>
+                <a:ea typeface="MS UI Gothic" panose="020B0600070205080204" pitchFamily="50" charset="-128"/>
+              </a:rPr>
+              <a:t>., 2011</a:t>
+            </a:r>
+            <a:r>
+              <a:rPr lang="en-US" altLang="ja-JP" dirty="0">
+                <a:latin typeface="Cambria" panose="02040503050406030204" pitchFamily="18" charset="0"/>
+                <a:ea typeface="MS UI Gothic" panose="020B0600070205080204" pitchFamily="50" charset="-128"/>
+              </a:rPr>
+              <a:t>)</a:t>
             </a:r>
           </a:p>
           <a:p>
@@ -10841,12 +11020,12 @@
               <a:buChar char="•"/>
             </a:pPr>
             <a:r>
-              <a:rPr lang="ja-JP" altLang="en-US" dirty="0">
+              <a:rPr lang="ja-JP" altLang="en-US" dirty="0" smtClean="0">
                 <a:latin typeface="Cambria" panose="02040503050406030204" pitchFamily="18" charset="0"/>
                 <a:ea typeface="MS UI Gothic" panose="020B0600070205080204" pitchFamily="50" charset="-128"/>
                 <a:cs typeface="Source Han Sans JP Normal"/>
               </a:rPr>
-              <a:t>メカニズム</a:t>
+              <a:t>メカニズム：さまざまなモデルで解釈可能</a:t>
             </a:r>
             <a:endParaRPr lang="en-US" altLang="ja-JP" dirty="0">
               <a:latin typeface="Cambria" panose="02040503050406030204" pitchFamily="18" charset="0"/>
@@ -12513,6 +12692,36 @@
           </a:p>
         </p:txBody>
       </p:sp>
+      <p:pic>
+        <p:nvPicPr>
+          <p:cNvPr id="7" name="図 6"/>
+          <p:cNvPicPr>
+            <a:picLocks noChangeAspect="1"/>
+          </p:cNvPicPr>
+          <p:nvPr/>
+        </p:nvPicPr>
+        <p:blipFill>
+          <a:blip r:embed="rId5" cstate="hqprint">
+            <a:extLst>
+              <a:ext uri="{28A0092B-C50C-407E-A947-70E740481C1C}">
+                <a14:useLocalDpi xmlns:a14="http://schemas.microsoft.com/office/drawing/2010/main" val="0"/>
+              </a:ext>
+            </a:extLst>
+          </a:blip>
+          <a:stretch>
+            <a:fillRect/>
+          </a:stretch>
+        </p:blipFill>
+        <p:spPr>
+          <a:xfrm>
+            <a:off x="11483202" y="5487945"/>
+            <a:ext cx="682573" cy="689018"/>
+          </a:xfrm>
+          <a:prstGeom prst="rect">
+            <a:avLst/>
+          </a:prstGeom>
+        </p:spPr>
+      </p:pic>
     </p:spTree>
     <p:extLst>
       <p:ext uri="{BB962C8B-B14F-4D97-AF65-F5344CB8AC3E}">
@@ -12647,8 +12856,9 @@
             <a:ext cx="5530278" cy="4800600"/>
           </a:xfrm>
           <a:solidFill>
-            <a:schemeClr val="bg1">
-              <a:lumMod val="95000"/>
+            <a:schemeClr val="accent1">
+              <a:lumMod val="20000"/>
+              <a:lumOff val="80000"/>
             </a:schemeClr>
           </a:solidFill>
         </p:spPr>
@@ -13219,6 +13429,36 @@
           </a:p>
         </p:txBody>
       </p:sp>
+      <p:pic>
+        <p:nvPicPr>
+          <p:cNvPr id="8" name="図 7"/>
+          <p:cNvPicPr>
+            <a:picLocks noChangeAspect="1"/>
+          </p:cNvPicPr>
+          <p:nvPr/>
+        </p:nvPicPr>
+        <p:blipFill>
+          <a:blip r:embed="rId4" cstate="hqprint">
+            <a:extLst>
+              <a:ext uri="{28A0092B-C50C-407E-A947-70E740481C1C}">
+                <a14:useLocalDpi xmlns:a14="http://schemas.microsoft.com/office/drawing/2010/main" val="0"/>
+              </a:ext>
+            </a:extLst>
+          </a:blip>
+          <a:stretch>
+            <a:fillRect/>
+          </a:stretch>
+        </p:blipFill>
+        <p:spPr>
+          <a:xfrm>
+            <a:off x="3921747" y="250947"/>
+            <a:ext cx="892073" cy="967460"/>
+          </a:xfrm>
+          <a:prstGeom prst="rect">
+            <a:avLst/>
+          </a:prstGeom>
+        </p:spPr>
+      </p:pic>
     </p:spTree>
     <p:extLst>
       <p:ext uri="{BB962C8B-B14F-4D97-AF65-F5344CB8AC3E}">

</xml_diff>